<commit_message>
- Retocados ficheros de presentacion
</commit_message>
<xml_diff>
--- a/documentacion/Observaterra-Presentacion.pptx
+++ b/documentacion/Observaterra-Presentacion.pptx
@@ -114,7 +114,7 @@
   </p:defaultTextStyle>
   <p:extLst>
     <p:ext uri="{EFAFB233-063F-42B5-8137-9DF3F51BA10A}">
-      <p15:sldGuideLst xmlns:p15="http://schemas.microsoft.com/office/powerpoint/2012/main"/>
+      <p15:sldGuideLst xmlns:p15="http://schemas.microsoft.com/office/powerpoint/2012/main" xmlns=""/>
     </p:ext>
   </p:extLst>
 </p:presentation>
@@ -123,11 +123,7 @@
 <file path=ppt/commentAuthors.xml><?xml version="1.0" encoding="utf-8"?>
 <p:cmAuthorLst xmlns:a="http://schemas.openxmlformats.org/drawingml/2006/main" xmlns:r="http://schemas.openxmlformats.org/officeDocument/2006/relationships" xmlns:p="http://schemas.openxmlformats.org/presentationml/2006/main">
   <p:cmAuthor id="1" name="Dani Tella González" initials="DTG" lastIdx="5" clrIdx="0">
-    <p:extLst>
-      <p:ext uri="{19B8F6BF-5375-455C-9EA6-DF929625EA0E}">
-        <p15:presenceInfo xmlns:p15="http://schemas.microsoft.com/office/powerpoint/2012/main" userId="dd3382583002e7c8" providerId="Windows Live"/>
-      </p:ext>
-    </p:extLst>
+    <p:extLst/>
   </p:cmAuthor>
 </p:cmAuthorLst>
 </file>
@@ -543,16 +539,42 @@
               <a:t> y tal hemos creado un portal web nos mola la </a:t>
             </a:r>
             <a:r>
+              <a:rPr lang="es-ES" baseline="0" dirty="0" smtClean="0"/>
+              <a:t>FARLOPA!!!</a:t>
+            </a:r>
+          </a:p>
+          <a:p>
+            <a:r>
+              <a:rPr lang="es-ES" baseline="0" dirty="0" smtClean="0"/>
+              <a:t>Decir que esto </a:t>
+            </a:r>
+            <a:r>
               <a:rPr lang="es-ES" baseline="0" dirty="0" err="1" smtClean="0"/>
-              <a:t>farlopa</a:t>
+              <a:t>sera</a:t>
             </a:r>
             <a:r>
               <a:rPr lang="es-ES" baseline="0" dirty="0" smtClean="0"/>
-              <a:t> </a:t>
+              <a:t> una breve </a:t>
             </a:r>
             <a:r>
               <a:rPr lang="es-ES" baseline="0" dirty="0" err="1" smtClean="0"/>
-              <a:t>etc</a:t>
+              <a:t>introduccion</a:t>
+            </a:r>
+            <a:r>
+              <a:rPr lang="es-ES" baseline="0" dirty="0" smtClean="0"/>
+              <a:t> e </a:t>
+            </a:r>
+            <a:r>
+              <a:rPr lang="es-ES" baseline="0" dirty="0" err="1" smtClean="0"/>
+              <a:t>explicacion</a:t>
+            </a:r>
+            <a:r>
+              <a:rPr lang="es-ES" baseline="0" dirty="0" smtClean="0"/>
+              <a:t> y que posteriormente pasaremos a enseñar la </a:t>
+            </a:r>
+            <a:r>
+              <a:rPr lang="es-ES" baseline="0" dirty="0" err="1" smtClean="0"/>
+              <a:t>aplicacion</a:t>
             </a:r>
             <a:endParaRPr lang="es-ES" dirty="0"/>
           </a:p>
@@ -851,11 +873,7 @@
             </a:pPr>
             <a:r>
               <a:rPr lang="es-ES_tradnl" baseline="0" dirty="0" smtClean="0"/>
-              <a:t>Durante el proceso de desarrollo de la aplicación hemos utilizado la metodología </a:t>
-            </a:r>
-            <a:r>
-              <a:rPr lang="es-ES_tradnl" baseline="0" dirty="0" smtClean="0"/>
-              <a:t>de </a:t>
+              <a:t>Durante el proceso de desarrollo de la aplicación hemos utilizado la metodología de </a:t>
             </a:r>
             <a:r>
               <a:rPr lang="es-ES_tradnl" baseline="0" dirty="0" err="1" smtClean="0"/>
@@ -897,7 +915,6 @@
               <a:rPr lang="es-ES_tradnl" baseline="0" dirty="0" smtClean="0"/>
               <a:t> pues todos hacíamos de todo, retocando aquellas partes que considerábamos mas importantes finalizar.</a:t>
             </a:r>
-            <a:endParaRPr lang="es-ES_tradnl" baseline="0" dirty="0" smtClean="0"/>
           </a:p>
           <a:p>
             <a:pPr marL="171450" indent="-171450">
@@ -906,23 +923,7 @@
             </a:pPr>
             <a:r>
               <a:rPr lang="es-ES_tradnl" baseline="0" dirty="0" smtClean="0"/>
-              <a:t>La arquitectura de la </a:t>
-            </a:r>
-            <a:r>
-              <a:rPr lang="es-ES_tradnl" baseline="0" dirty="0" smtClean="0"/>
-              <a:t>aplicación </a:t>
-            </a:r>
-            <a:r>
-              <a:rPr lang="es-ES_tradnl" baseline="0" dirty="0" smtClean="0"/>
-              <a:t>esta basada en el </a:t>
-            </a:r>
-            <a:r>
-              <a:rPr lang="es-ES_tradnl" baseline="0" dirty="0" smtClean="0"/>
-              <a:t>patrón-capas  </a:t>
-            </a:r>
-            <a:r>
-              <a:rPr lang="es-ES_tradnl" baseline="0" dirty="0" smtClean="0"/>
-              <a:t>implementado con </a:t>
+              <a:t>La arquitectura de la aplicación esta basada en el patrón-capas  implementado con </a:t>
             </a:r>
             <a:r>
               <a:rPr lang="es-ES_tradnl" baseline="0" dirty="0" err="1" smtClean="0"/>
@@ -930,11 +931,7 @@
             </a:r>
             <a:r>
               <a:rPr lang="es-ES_tradnl" baseline="0" dirty="0" smtClean="0"/>
-              <a:t> donde la capa de presentación que implementa </a:t>
-            </a:r>
-            <a:r>
-              <a:rPr lang="es-ES_tradnl" baseline="0" dirty="0" smtClean="0"/>
-              <a:t>MVC o modelo vista controlador que nos brinda Play </a:t>
+              <a:t> donde la capa de presentación que implementa MVC o modelo vista controlador que nos brinda Play </a:t>
             </a:r>
             <a:r>
               <a:rPr lang="es-ES_tradnl" baseline="0" dirty="0" err="1" smtClean="0"/>
@@ -952,7 +949,6 @@
               <a:rPr lang="es-ES_tradnl" baseline="0" dirty="0" smtClean="0"/>
               <a:t> de la capa de negocio para almacenar o pedir datos</a:t>
             </a:r>
-            <a:endParaRPr lang="es-ES_tradnl" baseline="0" dirty="0" smtClean="0"/>
           </a:p>
         </p:txBody>
       </p:sp>
@@ -1112,8 +1108,63 @@
             </a:pPr>
             <a:r>
               <a:rPr lang="es-ES" baseline="0" dirty="0" smtClean="0"/>
-              <a:t>Control de versiones para facilitar el desarrollo de la app</a:t>
-            </a:r>
+              <a:t>Control de versiones para facilitar el desarrollo de la </a:t>
+            </a:r>
+            <a:r>
+              <a:rPr lang="es-ES" baseline="0" dirty="0" smtClean="0"/>
+              <a:t>app</a:t>
+            </a:r>
+          </a:p>
+          <a:p>
+            <a:pPr marL="171450" indent="-171450">
+              <a:buFont typeface="Arial" panose="020B0604020202020204" pitchFamily="34" charset="0"/>
+              <a:buChar char="•"/>
+            </a:pPr>
+            <a:r>
+              <a:rPr lang="es-ES" baseline="0" dirty="0" smtClean="0"/>
+              <a:t>(RECORDAR MENCIONAR JAVA, HAY QUE EXPLICAR UN POCO EL PORQUE DE ESTAS TECNO. En plan pues java porque </a:t>
+            </a:r>
+            <a:r>
+              <a:rPr lang="es-ES" baseline="0" dirty="0" err="1" smtClean="0"/>
+              <a:t>chanamos</a:t>
+            </a:r>
+            <a:r>
+              <a:rPr lang="es-ES" baseline="0" dirty="0" smtClean="0"/>
+              <a:t>, </a:t>
+            </a:r>
+            <a:r>
+              <a:rPr lang="es-ES" baseline="0" dirty="0" err="1" smtClean="0"/>
+              <a:t>ebean</a:t>
+            </a:r>
+            <a:r>
+              <a:rPr lang="es-ES" baseline="0" dirty="0" smtClean="0"/>
+              <a:t> porque ayuda </a:t>
+            </a:r>
+            <a:r>
+              <a:rPr lang="es-ES" baseline="0" dirty="0" err="1" smtClean="0"/>
+              <a:t>play</a:t>
+            </a:r>
+            <a:r>
+              <a:rPr lang="es-ES" baseline="0" dirty="0" smtClean="0"/>
+              <a:t>, </a:t>
+            </a:r>
+            <a:r>
+              <a:rPr lang="es-ES" baseline="0" dirty="0" err="1" smtClean="0"/>
+              <a:t>git</a:t>
+            </a:r>
+            <a:r>
+              <a:rPr lang="es-ES" baseline="0" dirty="0" smtClean="0"/>
+              <a:t> porque obligaron…algo </a:t>
+            </a:r>
+            <a:r>
+              <a:rPr lang="es-ES" baseline="0" dirty="0" err="1" smtClean="0"/>
+              <a:t>asi</a:t>
+            </a:r>
+            <a:r>
+              <a:rPr lang="es-ES" baseline="0" dirty="0" smtClean="0"/>
+              <a:t>)</a:t>
+            </a:r>
+            <a:endParaRPr lang="es-ES" baseline="0" dirty="0" smtClean="0"/>
           </a:p>
           <a:p>
             <a:pPr marL="0" indent="0">
@@ -7666,7 +7717,6 @@
               <a:rPr lang="es-ES_tradnl" sz="2400" dirty="0" smtClean="0"/>
               <a:t>API </a:t>
             </a:r>
-            <a:endParaRPr lang="es-ES_tradnl" sz="2400" dirty="0" smtClean="0"/>
           </a:p>
           <a:p>
             <a:r>
@@ -7959,11 +8009,7 @@
           <a:p>
             <a:r>
               <a:rPr lang="es-ES_tradnl" sz="2800" dirty="0" smtClean="0"/>
-              <a:t>Metodologías </a:t>
-            </a:r>
-            <a:r>
-              <a:rPr lang="es-ES_tradnl" sz="2800" dirty="0" smtClean="0"/>
-              <a:t>ágiles de programación</a:t>
+              <a:t>Metodologías ágiles de programación</a:t>
             </a:r>
           </a:p>
           <a:p>
@@ -8052,7 +8098,6 @@
               <a:rPr lang="es-ES_tradnl" dirty="0" smtClean="0"/>
               <a:t>Play Framework 2.2.x</a:t>
             </a:r>
-            <a:endParaRPr lang="es-ES_tradnl" dirty="0" smtClean="0"/>
           </a:p>
           <a:p>
             <a:r>
@@ -8063,7 +8108,6 @@
               <a:rPr lang="es-ES_tradnl" dirty="0" smtClean="0"/>
               <a:t> </a:t>
             </a:r>
-            <a:endParaRPr lang="es-ES_tradnl" dirty="0" smtClean="0"/>
           </a:p>
           <a:p>
             <a:r>
@@ -8903,7 +8947,7 @@
   <a:extraClrSchemeLst/>
   <a:extLst>
     <a:ext uri="{05A4C25C-085E-4340-85A3-A5531E510DB2}">
-      <thm15:themeFamily xmlns:thm15="http://schemas.microsoft.com/office/thememl/2012/main" name="Parallax" id="{3388167B-A2EB-4685-9635-1831D9AEF8C4}" vid="{4F7A876A-7598-49CA-AFC8-8EDA2551E4A7}"/>
+      <thm15:themeFamily xmlns:thm15="http://schemas.microsoft.com/office/thememl/2012/main" xmlns="" name="Parallax" id="{3388167B-A2EB-4685-9635-1831D9AEF8C4}" vid="{4F7A876A-7598-49CA-AFC8-8EDA2551E4A7}"/>
     </a:ext>
   </a:extLst>
 </a:theme>
@@ -9164,7 +9208,7 @@
   <a:extraClrSchemeLst/>
   <a:extLst>
     <a:ext uri="{05A4C25C-085E-4340-85A3-A5531E510DB2}">
-      <thm15:themeFamily xmlns:thm15="http://schemas.microsoft.com/office/thememl/2012/main" name="Office Theme" id="{62F939B6-93AF-4DB8-9C6B-D6C7DFDC589F}" vid="{4A3C46E8-61CC-4603-A589-7422A47A8E4A}"/>
+      <thm15:themeFamily xmlns:thm15="http://schemas.microsoft.com/office/thememl/2012/main" xmlns="" name="Office Theme" id="{62F939B6-93AF-4DB8-9C6B-D6C7DFDC589F}" vid="{4A3C46E8-61CC-4603-A589-7422A47A8E4A}"/>
     </a:ext>
   </a:extLst>
 </a:theme>

</xml_diff>

<commit_message>
docu + presentacion + arreglos  de errores
</commit_message>
<xml_diff>
--- a/documentacion/Observaterra-Presentacion.pptx
+++ b/documentacion/Observaterra-Presentacion.pptx
@@ -114,7 +114,18 @@
   </p:defaultTextStyle>
   <p:extLst>
     <p:ext uri="{EFAFB233-063F-42B5-8137-9DF3F51BA10A}">
-      <p15:sldGuideLst xmlns="" xmlns:p15="http://schemas.microsoft.com/office/powerpoint/2012/main"/>
+      <p15:sldGuideLst xmlns:p15="http://schemas.microsoft.com/office/powerpoint/2012/main">
+        <p15:guide id="1" orient="horz" pos="2160">
+          <p15:clr>
+            <a:srgbClr val="A4A3A4"/>
+          </p15:clr>
+        </p15:guide>
+        <p15:guide id="2" pos="3840">
+          <p15:clr>
+            <a:srgbClr val="A4A3A4"/>
+          </p15:clr>
+        </p15:guide>
+      </p15:sldGuideLst>
     </p:ext>
   </p:extLst>
 </p:presentation>
@@ -210,7 +221,7 @@
           <a:p>
             <a:fld id="{F88098D6-B0A7-48EB-84E3-33C562D904A8}" type="datetimeFigureOut">
               <a:rPr lang="es-ES" smtClean="0"/>
-              <a:t>05/05/2014</a:t>
+              <a:t>06/05/2014</a:t>
             </a:fld>
             <a:endParaRPr lang="es-ES"/>
           </a:p>
@@ -943,11 +954,7 @@
             </a:r>
             <a:r>
               <a:rPr lang="es-ES_tradnl" baseline="0" dirty="0" smtClean="0"/>
-              <a:t> de la capa de negocio para almacenar o pedir </a:t>
-            </a:r>
-            <a:r>
-              <a:rPr lang="es-ES_tradnl" baseline="0" dirty="0" smtClean="0"/>
-              <a:t>datos</a:t>
+              <a:t> de la capa de negocio para almacenar o pedir datos</a:t>
             </a:r>
           </a:p>
           <a:p>
@@ -1294,6 +1301,16 @@
           <a:lstStyle/>
           <a:p>
             <a:r>
+              <a:rPr lang="es-ES" dirty="0" err="1" smtClean="0"/>
+              <a:t>Diferenciacion</a:t>
+            </a:r>
+            <a:r>
+              <a:rPr lang="es-ES" dirty="0" smtClean="0"/>
+              <a:t> de funcionalidad</a:t>
+            </a:r>
+          </a:p>
+          <a:p>
+            <a:r>
               <a:rPr lang="es-ES" dirty="0" smtClean="0"/>
               <a:t>Usamos</a:t>
             </a:r>
@@ -1390,16 +1407,14 @@
           <a:lstStyle/>
           <a:p>
             <a:r>
-              <a:rPr lang="es-ES_tradnl" dirty="0" smtClean="0"/>
-              <a:t>Pasos:</a:t>
-            </a:r>
-          </a:p>
-          <a:p>
-            <a:r>
-              <a:rPr lang="es-ES_tradnl" dirty="0" smtClean="0"/>
-              <a:t>1º</a:t>
-            </a:r>
-            <a:endParaRPr lang="es-ES" dirty="0"/>
+              <a:rPr lang="es-ES_tradnl" smtClean="0"/>
+              <a:t>Seguir</a:t>
+            </a:r>
+            <a:r>
+              <a:rPr lang="es-ES_tradnl" baseline="0" smtClean="0"/>
+              <a:t> guion</a:t>
+            </a:r>
+            <a:endParaRPr lang="es-ES_tradnl" dirty="0" smtClean="0"/>
           </a:p>
         </p:txBody>
       </p:sp>
@@ -1941,7 +1956,7 @@
           <a:p>
             <a:fld id="{237052A8-765E-433D-B2AF-114CC289D868}" type="datetimeFigureOut">
               <a:rPr lang="es-ES" smtClean="0"/>
-              <a:t>05/05/2014</a:t>
+              <a:t>06/05/2014</a:t>
             </a:fld>
             <a:endParaRPr lang="es-ES"/>
           </a:p>
@@ -2237,7 +2252,7 @@
           <a:p>
             <a:fld id="{237052A8-765E-433D-B2AF-114CC289D868}" type="datetimeFigureOut">
               <a:rPr lang="es-ES" smtClean="0"/>
-              <a:t>05/05/2014</a:t>
+              <a:t>06/05/2014</a:t>
             </a:fld>
             <a:endParaRPr lang="es-ES"/>
           </a:p>
@@ -2485,7 +2500,7 @@
           <a:p>
             <a:fld id="{237052A8-765E-433D-B2AF-114CC289D868}" type="datetimeFigureOut">
               <a:rPr lang="es-ES" smtClean="0"/>
-              <a:t>05/05/2014</a:t>
+              <a:t>06/05/2014</a:t>
             </a:fld>
             <a:endParaRPr lang="es-ES"/>
           </a:p>
@@ -3025,7 +3040,7 @@
           <a:p>
             <a:fld id="{237052A8-765E-433D-B2AF-114CC289D868}" type="datetimeFigureOut">
               <a:rPr lang="es-ES" smtClean="0"/>
-              <a:t>05/05/2014</a:t>
+              <a:t>06/05/2014</a:t>
             </a:fld>
             <a:endParaRPr lang="es-ES"/>
           </a:p>
@@ -3273,7 +3288,7 @@
           <a:p>
             <a:fld id="{237052A8-765E-433D-B2AF-114CC289D868}" type="datetimeFigureOut">
               <a:rPr lang="es-ES" smtClean="0"/>
-              <a:t>05/05/2014</a:t>
+              <a:t>06/05/2014</a:t>
             </a:fld>
             <a:endParaRPr lang="es-ES"/>
           </a:p>
@@ -3805,7 +3820,7 @@
           <a:p>
             <a:fld id="{237052A8-765E-433D-B2AF-114CC289D868}" type="datetimeFigureOut">
               <a:rPr lang="es-ES" smtClean="0"/>
-              <a:t>05/05/2014</a:t>
+              <a:t>06/05/2014</a:t>
             </a:fld>
             <a:endParaRPr lang="es-ES"/>
           </a:p>
@@ -4102,7 +4117,7 @@
           <a:p>
             <a:fld id="{237052A8-765E-433D-B2AF-114CC289D868}" type="datetimeFigureOut">
               <a:rPr lang="es-ES" smtClean="0"/>
-              <a:t>05/05/2014</a:t>
+              <a:t>06/05/2014</a:t>
             </a:fld>
             <a:endParaRPr lang="es-ES"/>
           </a:p>
@@ -4276,7 +4291,7 @@
           <a:p>
             <a:fld id="{237052A8-765E-433D-B2AF-114CC289D868}" type="datetimeFigureOut">
               <a:rPr lang="es-ES" smtClean="0"/>
-              <a:t>05/05/2014</a:t>
+              <a:t>06/05/2014</a:t>
             </a:fld>
             <a:endParaRPr lang="es-ES"/>
           </a:p>
@@ -4456,7 +4471,7 @@
           <a:p>
             <a:fld id="{237052A8-765E-433D-B2AF-114CC289D868}" type="datetimeFigureOut">
               <a:rPr lang="es-ES" smtClean="0"/>
-              <a:t>05/05/2014</a:t>
+              <a:t>06/05/2014</a:t>
             </a:fld>
             <a:endParaRPr lang="es-ES"/>
           </a:p>
@@ -4626,7 +4641,7 @@
           <a:p>
             <a:fld id="{237052A8-765E-433D-B2AF-114CC289D868}" type="datetimeFigureOut">
               <a:rPr lang="es-ES" smtClean="0"/>
-              <a:t>05/05/2014</a:t>
+              <a:t>06/05/2014</a:t>
             </a:fld>
             <a:endParaRPr lang="es-ES"/>
           </a:p>
@@ -4877,7 +4892,7 @@
           <a:p>
             <a:fld id="{237052A8-765E-433D-B2AF-114CC289D868}" type="datetimeFigureOut">
               <a:rPr lang="es-ES" smtClean="0"/>
-              <a:t>05/05/2014</a:t>
+              <a:t>06/05/2014</a:t>
             </a:fld>
             <a:endParaRPr lang="es-ES"/>
           </a:p>
@@ -5174,7 +5189,7 @@
           <a:p>
             <a:fld id="{237052A8-765E-433D-B2AF-114CC289D868}" type="datetimeFigureOut">
               <a:rPr lang="es-ES" smtClean="0"/>
-              <a:t>05/05/2014</a:t>
+              <a:t>06/05/2014</a:t>
             </a:fld>
             <a:endParaRPr lang="es-ES"/>
           </a:p>
@@ -5616,7 +5631,7 @@
           <a:p>
             <a:fld id="{237052A8-765E-433D-B2AF-114CC289D868}" type="datetimeFigureOut">
               <a:rPr lang="es-ES" smtClean="0"/>
-              <a:t>05/05/2014</a:t>
+              <a:t>06/05/2014</a:t>
             </a:fld>
             <a:endParaRPr lang="es-ES"/>
           </a:p>
@@ -5734,7 +5749,7 @@
           <a:p>
             <a:fld id="{237052A8-765E-433D-B2AF-114CC289D868}" type="datetimeFigureOut">
               <a:rPr lang="es-ES" smtClean="0"/>
-              <a:t>05/05/2014</a:t>
+              <a:t>06/05/2014</a:t>
             </a:fld>
             <a:endParaRPr lang="es-ES"/>
           </a:p>
@@ -5829,7 +5844,7 @@
           <a:p>
             <a:fld id="{237052A8-765E-433D-B2AF-114CC289D868}" type="datetimeFigureOut">
               <a:rPr lang="es-ES" smtClean="0"/>
-              <a:t>05/05/2014</a:t>
+              <a:t>06/05/2014</a:t>
             </a:fld>
             <a:endParaRPr lang="es-ES"/>
           </a:p>
@@ -6112,7 +6127,7 @@
           <a:p>
             <a:fld id="{237052A8-765E-433D-B2AF-114CC289D868}" type="datetimeFigureOut">
               <a:rPr lang="es-ES" smtClean="0"/>
-              <a:t>05/05/2014</a:t>
+              <a:t>06/05/2014</a:t>
             </a:fld>
             <a:endParaRPr lang="es-ES"/>
           </a:p>
@@ -6403,7 +6418,7 @@
           <a:p>
             <a:fld id="{237052A8-765E-433D-B2AF-114CC289D868}" type="datetimeFigureOut">
               <a:rPr lang="es-ES" smtClean="0"/>
-              <a:t>05/05/2014</a:t>
+              <a:t>06/05/2014</a:t>
             </a:fld>
             <a:endParaRPr lang="es-ES"/>
           </a:p>
@@ -6933,7 +6948,7 @@
           <a:p>
             <a:fld id="{237052A8-765E-433D-B2AF-114CC289D868}" type="datetimeFigureOut">
               <a:rPr lang="es-ES" smtClean="0"/>
-              <a:t>05/05/2014</a:t>
+              <a:t>06/05/2014</a:t>
             </a:fld>
             <a:endParaRPr lang="es-ES"/>
           </a:p>
@@ -7819,6 +7834,9 @@
                     <p:cTn id="3" fill="hold">
                       <p:stCondLst>
                         <p:cond delay="indefinite"/>
+                        <p:cond evt="onBegin" delay="0">
+                          <p:tn val="2"/>
+                        </p:cond>
                       </p:stCondLst>
                       <p:childTnLst>
                         <p:par>
@@ -7828,7 +7846,7 @@
                             </p:stCondLst>
                             <p:childTnLst>
                               <p:par>
-                                <p:cTn id="5" presetID="32" presetClass="emph" presetSubtype="0" fill="hold" nodeType="clickEffect">
+                                <p:cTn id="5" presetID="32" presetClass="emph" presetSubtype="0" fill="hold" nodeType="withEffect">
                                   <p:stCondLst>
                                     <p:cond delay="0"/>
                                   </p:stCondLst>
@@ -8703,6 +8721,40 @@
           </a:effectLst>
         </p:spPr>
       </p:pic>
+      <p:sp>
+        <p:nvSpPr>
+          <p:cNvPr id="4" name="CuadroTexto 3">
+            <a:hlinkClick r:id="rId14" tooltip="www.ObservaTerra.com"/>
+          </p:cNvPr>
+          <p:cNvSpPr txBox="1"/>
+          <p:nvPr/>
+        </p:nvSpPr>
+        <p:spPr>
+          <a:xfrm>
+            <a:off x="5890847" y="5750170"/>
+            <a:ext cx="5943600" cy="369332"/>
+          </a:xfrm>
+          <a:prstGeom prst="rect">
+            <a:avLst/>
+          </a:prstGeom>
+          <a:noFill/>
+        </p:spPr>
+        <p:txBody>
+          <a:bodyPr wrap="square" rtlCol="0">
+            <a:spAutoFit/>
+          </a:bodyPr>
+          <a:lstStyle/>
+          <a:p>
+            <a:r>
+              <a:rPr lang="es-ES" smtClean="0">
+                <a:hlinkClick r:id="rId14"/>
+              </a:rPr>
+              <a:t>www.ObservaTerra.com</a:t>
+            </a:r>
+            <a:endParaRPr lang="es-ES" dirty="0"/>
+          </a:p>
+        </p:txBody>
+      </p:sp>
     </p:spTree>
     <p:extLst>
       <p:ext uri="{BB962C8B-B14F-4D97-AF65-F5344CB8AC3E}">
@@ -8973,7 +9025,7 @@
   <a:extraClrSchemeLst/>
   <a:extLst>
     <a:ext uri="{05A4C25C-085E-4340-85A3-A5531E510DB2}">
-      <thm15:themeFamily xmlns="" xmlns:thm15="http://schemas.microsoft.com/office/thememl/2012/main" name="Parallax" id="{3388167B-A2EB-4685-9635-1831D9AEF8C4}" vid="{4F7A876A-7598-49CA-AFC8-8EDA2551E4A7}"/>
+      <thm15:themeFamily xmlns:thm15="http://schemas.microsoft.com/office/thememl/2012/main" name="Parallax" id="{3388167B-A2EB-4685-9635-1831D9AEF8C4}" vid="{4F7A876A-7598-49CA-AFC8-8EDA2551E4A7}"/>
     </a:ext>
   </a:extLst>
 </a:theme>
@@ -9234,7 +9286,7 @@
   <a:extraClrSchemeLst/>
   <a:extLst>
     <a:ext uri="{05A4C25C-085E-4340-85A3-A5531E510DB2}">
-      <thm15:themeFamily xmlns="" xmlns:thm15="http://schemas.microsoft.com/office/thememl/2012/main" name="Office Theme" id="{62F939B6-93AF-4DB8-9C6B-D6C7DFDC589F}" vid="{4A3C46E8-61CC-4603-A589-7422A47A8E4A}"/>
+      <thm15:themeFamily xmlns:thm15="http://schemas.microsoft.com/office/thememl/2012/main" name="Office Theme" id="{62F939B6-93AF-4DB8-9C6B-D6C7DFDC589F}" vid="{4A3C46E8-61CC-4603-A589-7422A47A8E4A}"/>
     </a:ext>
   </a:extLst>
 </a:theme>

</xml_diff>